<commit_message>
Praesentation weiterbearbeitet, spielvorlagen restrukturiert
</commit_message>
<xml_diff>
--- a/documentation/Präsentation_Hashi_TeamSG.pptx
+++ b/documentation/Präsentation_Hashi_TeamSG.pptx
@@ -210,7 +210,7 @@
           <a:p>
             <a:fld id="{E0AA2C8D-CD60-42F0-B358-E14A0DF454F0}" type="datetimeFigureOut">
               <a:rPr lang="de-CH" smtClean="0"/>
-              <a:t>06.06.2016</a:t>
+              <a:t>07.06.2016</a:t>
             </a:fld>
             <a:endParaRPr lang="de-CH"/>
           </a:p>
@@ -523,10 +523,9 @@
           <a:lstStyle/>
           <a:p>
             <a:r>
-              <a:rPr lang="de-CH" dirty="0" smtClean="0"/>
+              <a:rPr lang="de-CH" dirty="0"/>
               <a:t>Chris</a:t>
             </a:r>
-            <a:endParaRPr lang="de-CH" dirty="0"/>
           </a:p>
         </p:txBody>
       </p:sp>
@@ -611,15 +610,15 @@
           <a:lstStyle/>
           <a:p>
             <a:r>
-              <a:rPr lang="de-CH" dirty="0" err="1" smtClean="0"/>
+              <a:rPr lang="de-CH" dirty="0" err="1"/>
               <a:t>Scrum</a:t>
             </a:r>
             <a:r>
-              <a:rPr lang="de-CH" dirty="0" smtClean="0"/>
+              <a:rPr lang="de-CH" dirty="0"/>
               <a:t> Erfahrungen</a:t>
             </a:r>
             <a:r>
-              <a:rPr lang="de-CH" baseline="0" dirty="0" smtClean="0"/>
+              <a:rPr lang="de-CH" baseline="0" dirty="0"/>
               <a:t> -&gt; Joel</a:t>
             </a:r>
           </a:p>
@@ -709,40 +708,131 @@
           <a:lstStyle/>
           <a:p>
             <a:r>
-              <a:rPr lang="de-CH" baseline="0" dirty="0" err="1" smtClean="0"/>
+              <a:rPr lang="de-CH" baseline="0" dirty="0" err="1"/>
               <a:t>Git</a:t>
             </a:r>
             <a:r>
-              <a:rPr lang="de-CH" baseline="0" dirty="0" smtClean="0"/>
+              <a:rPr lang="de-CH" baseline="0" dirty="0"/>
               <a:t> -&gt; </a:t>
             </a:r>
             <a:r>
-              <a:rPr lang="de-CH" baseline="0" dirty="0" err="1" smtClean="0"/>
+              <a:rPr lang="de-CH" baseline="0" dirty="0" err="1"/>
               <a:t>joel</a:t>
             </a:r>
-            <a:endParaRPr lang="de-CH" baseline="0" dirty="0" smtClean="0"/>
-          </a:p>
-          <a:p>
-            <a:r>
-              <a:rPr lang="de-CH" baseline="0" dirty="0" smtClean="0"/>
+            <a:endParaRPr lang="de-CH" baseline="0" dirty="0"/>
+          </a:p>
+          <a:p>
+            <a:r>
+              <a:rPr lang="de-CH" baseline="0" dirty="0"/>
               <a:t>Neo4j -&gt; Philippe</a:t>
             </a:r>
           </a:p>
           <a:p>
             <a:r>
-              <a:rPr lang="de-CH" baseline="0" dirty="0" smtClean="0"/>
+              <a:rPr lang="de-CH" baseline="0" dirty="0"/>
               <a:t>FXML -&gt; Martin</a:t>
             </a:r>
           </a:p>
           <a:p>
             <a:r>
-              <a:rPr lang="de-CH" baseline="0" dirty="0" err="1" smtClean="0"/>
+              <a:rPr lang="de-CH" baseline="0" dirty="0" err="1"/>
               <a:t>Junit</a:t>
             </a:r>
             <a:r>
-              <a:rPr lang="de-CH" baseline="0" dirty="0" smtClean="0"/>
+              <a:rPr lang="de-CH" baseline="0" dirty="0"/>
               <a:t> -&gt; Christian</a:t>
             </a:r>
+          </a:p>
+          <a:p>
+            <a:endParaRPr lang="de-CH" baseline="0" dirty="0"/>
+          </a:p>
+          <a:p>
+            <a:r>
+              <a:rPr lang="de-CH" baseline="0" dirty="0" err="1"/>
+              <a:t>Junit</a:t>
+            </a:r>
+            <a:r>
+              <a:rPr lang="de-CH" baseline="0" dirty="0"/>
+              <a:t>, </a:t>
+            </a:r>
+            <a:r>
+              <a:rPr lang="de-CH" baseline="0" dirty="0" err="1"/>
+              <a:t>EclEmma</a:t>
+            </a:r>
+            <a:r>
+              <a:rPr lang="de-CH" baseline="0" dirty="0"/>
+              <a:t>, Borland </a:t>
+            </a:r>
+            <a:r>
+              <a:rPr lang="de-CH" baseline="0" dirty="0" err="1"/>
+              <a:t>Together</a:t>
+            </a:r>
+            <a:endParaRPr lang="de-CH" baseline="0" dirty="0"/>
+          </a:p>
+          <a:p>
+            <a:pPr marL="171450" marR="0" lvl="1" indent="-171450" algn="l" defTabSz="914400" rtl="0" eaLnBrk="1" fontAlgn="auto" latinLnBrk="0" hangingPunct="1">
+              <a:lnSpc>
+                <a:spcPct val="100000"/>
+              </a:lnSpc>
+              <a:spcBef>
+                <a:spcPts val="0"/>
+              </a:spcBef>
+              <a:spcAft>
+                <a:spcPts val="0"/>
+              </a:spcAft>
+              <a:buClrTx/>
+              <a:buSzTx/>
+              <a:buFontTx/>
+              <a:buChar char="-"/>
+              <a:tabLst/>
+              <a:defRPr/>
+            </a:pPr>
+            <a:r>
+              <a:rPr lang="de-CH" baseline="0" dirty="0"/>
+              <a:t>Mühsames einfügen des existierenden Codes</a:t>
+            </a:r>
+          </a:p>
+          <a:p>
+            <a:pPr marL="171450" marR="0" lvl="1" indent="-171450" algn="l" defTabSz="914400" rtl="0" eaLnBrk="1" fontAlgn="auto" latinLnBrk="0" hangingPunct="1">
+              <a:lnSpc>
+                <a:spcPct val="100000"/>
+              </a:lnSpc>
+              <a:spcBef>
+                <a:spcPts val="0"/>
+              </a:spcBef>
+              <a:spcAft>
+                <a:spcPts val="0"/>
+              </a:spcAft>
+              <a:buClrTx/>
+              <a:buSzTx/>
+              <a:buFontTx/>
+              <a:buChar char="-"/>
+              <a:tabLst/>
+              <a:defRPr/>
+            </a:pPr>
+            <a:r>
+              <a:rPr lang="de-CH" baseline="0" dirty="0"/>
+              <a:t>Code </a:t>
+            </a:r>
+            <a:r>
+              <a:rPr lang="de-CH" baseline="0" dirty="0" err="1"/>
+              <a:t>Coverage</a:t>
+            </a:r>
+            <a:r>
+              <a:rPr lang="de-CH" baseline="0" dirty="0"/>
+              <a:t> Buggy (</a:t>
+            </a:r>
+            <a:r>
+              <a:rPr lang="de-CH" baseline="0" dirty="0" err="1"/>
+              <a:t>Enums</a:t>
+            </a:r>
+            <a:r>
+              <a:rPr lang="de-CH" baseline="0" dirty="0"/>
+              <a:t>)</a:t>
+            </a:r>
+          </a:p>
+          <a:p>
+            <a:endParaRPr lang="de-CH" baseline="0" dirty="0"/>
           </a:p>
         </p:txBody>
       </p:sp>
@@ -827,7 +917,7 @@
           <a:lstStyle/>
           <a:p>
             <a:r>
-              <a:rPr lang="de-CH" dirty="0" err="1" smtClean="0"/>
+              <a:rPr lang="de-CH" dirty="0" err="1"/>
               <a:t>Ghenzi</a:t>
             </a:r>
             <a:endParaRPr lang="de-CH" dirty="0"/>
@@ -932,9 +1022,10 @@
               <a:defRPr/>
             </a:pPr>
             <a:r>
-              <a:rPr lang="de-CH" dirty="0" smtClean="0"/>
+              <a:rPr lang="de-CH"/>
               <a:t>Joel</a:t>
             </a:r>
+            <a:endParaRPr lang="de-CH" dirty="0"/>
           </a:p>
           <a:p>
             <a:pPr marL="0" marR="0" indent="0" algn="l" defTabSz="914400" rtl="0" eaLnBrk="1" fontAlgn="auto" latinLnBrk="0" hangingPunct="1">
@@ -954,7 +1045,7 @@
               <a:tabLst/>
               <a:defRPr/>
             </a:pPr>
-            <a:endParaRPr lang="de-CH" dirty="0" smtClean="0"/>
+            <a:endParaRPr lang="de-CH" dirty="0"/>
           </a:p>
           <a:p>
             <a:pPr marL="0" marR="0" indent="0" algn="l" defTabSz="914400" rtl="0" eaLnBrk="1" fontAlgn="auto" latinLnBrk="0" hangingPunct="1">
@@ -974,7 +1065,7 @@
               <a:tabLst/>
               <a:defRPr/>
             </a:pPr>
-            <a:endParaRPr lang="de-CH" dirty="0" smtClean="0"/>
+            <a:endParaRPr lang="de-CH" dirty="0"/>
           </a:p>
           <a:p>
             <a:pPr marL="0" marR="0" indent="0" algn="l" defTabSz="914400" rtl="0" eaLnBrk="1" fontAlgn="auto" latinLnBrk="0" hangingPunct="1">
@@ -995,7 +1086,7 @@
               <a:defRPr/>
             </a:pPr>
             <a:r>
-              <a:rPr lang="de-CH" dirty="0" smtClean="0"/>
+              <a:rPr lang="de-CH" dirty="0"/>
               <a:t>Screenshot </a:t>
             </a:r>
             <a:r>
@@ -1090,10 +1181,9 @@
           <a:lstStyle/>
           <a:p>
             <a:r>
-              <a:rPr lang="de-CH" dirty="0" smtClean="0"/>
+              <a:rPr lang="de-CH" dirty="0"/>
               <a:t>Chris</a:t>
             </a:r>
-            <a:endParaRPr lang="de-CH" dirty="0"/>
           </a:p>
         </p:txBody>
       </p:sp>
@@ -1178,10 +1268,9 @@
           <a:lstStyle/>
           <a:p>
             <a:r>
-              <a:rPr lang="de-CH" dirty="0" smtClean="0"/>
+              <a:rPr lang="de-CH" dirty="0"/>
               <a:t>Chris</a:t>
             </a:r>
-            <a:endParaRPr lang="de-CH" dirty="0"/>
           </a:p>
         </p:txBody>
       </p:sp>
@@ -1266,10 +1355,9 @@
           <a:lstStyle/>
           <a:p>
             <a:r>
-              <a:rPr lang="de-CH" dirty="0" smtClean="0"/>
+              <a:rPr lang="de-CH" dirty="0"/>
               <a:t>Chris</a:t>
             </a:r>
-            <a:endParaRPr lang="de-CH" dirty="0"/>
           </a:p>
         </p:txBody>
       </p:sp>
@@ -1354,10 +1442,9 @@
           <a:lstStyle/>
           <a:p>
             <a:r>
-              <a:rPr lang="de-CH" dirty="0" smtClean="0"/>
+              <a:rPr lang="de-CH" dirty="0"/>
               <a:t>Mazenauer</a:t>
             </a:r>
-            <a:endParaRPr lang="de-CH" dirty="0"/>
           </a:p>
         </p:txBody>
       </p:sp>
@@ -1442,10 +1529,9 @@
           <a:lstStyle/>
           <a:p>
             <a:r>
-              <a:rPr lang="de-CH" dirty="0" smtClean="0"/>
+              <a:rPr lang="de-CH" dirty="0"/>
               <a:t>Mazenauer</a:t>
             </a:r>
-            <a:endParaRPr lang="de-CH" dirty="0"/>
           </a:p>
         </p:txBody>
       </p:sp>
@@ -1547,33 +1633,25 @@
               <a:defRPr/>
             </a:pPr>
             <a:r>
-              <a:rPr lang="de-CH" dirty="0" smtClean="0"/>
-              <a:t>MVC </a:t>
-            </a:r>
-            <a:r>
-              <a:rPr lang="de-CH" dirty="0"/>
-              <a:t>(Model-View-Controller):</a:t>
+              <a:rPr lang="de-CH" dirty="0"/>
+              <a:t>MVC (Model-View-Controller):</a:t>
             </a:r>
             <a:r>
               <a:rPr lang="de-CH" baseline="0" dirty="0"/>
-              <a:t> </a:t>
-            </a:r>
-            <a:r>
-              <a:rPr lang="de-CH" baseline="0" dirty="0" smtClean="0"/>
-              <a:t>			</a:t>
-            </a:r>
-            <a:r>
-              <a:rPr lang="de-CH" dirty="0" smtClean="0"/>
+              <a:t> 			</a:t>
+            </a:r>
+            <a:r>
+              <a:rPr lang="de-CH" dirty="0"/>
               <a:t>Martin</a:t>
             </a:r>
           </a:p>
           <a:p>
             <a:r>
-              <a:rPr lang="de-CH" dirty="0" smtClean="0"/>
+              <a:rPr lang="de-CH" dirty="0"/>
               <a:t>Factory:					</a:t>
             </a:r>
             <a:r>
-              <a:rPr lang="de-CH" dirty="0" err="1" smtClean="0"/>
+              <a:rPr lang="de-CH" dirty="0" err="1"/>
               <a:t>Ghenzi</a:t>
             </a:r>
             <a:endParaRPr lang="de-CH" dirty="0"/>
@@ -1608,15 +1686,15 @@
               <a:t> auf </a:t>
             </a:r>
             <a:r>
-              <a:rPr lang="de-CH" baseline="0" dirty="0" err="1" smtClean="0"/>
+              <a:rPr lang="de-CH" baseline="0" dirty="0" err="1"/>
               <a:t>BaseGraphDAS</a:t>
             </a:r>
             <a:r>
-              <a:rPr lang="de-CH" baseline="0" dirty="0" smtClean="0"/>
+              <a:rPr lang="de-CH" baseline="0" dirty="0"/>
               <a:t>		</a:t>
             </a:r>
             <a:r>
-              <a:rPr lang="de-CH" baseline="0" dirty="0" err="1" smtClean="0"/>
+              <a:rPr lang="de-CH" baseline="0" dirty="0" err="1"/>
               <a:t>Ghenzi</a:t>
             </a:r>
             <a:endParaRPr lang="de-CH" dirty="0"/>
@@ -1643,15 +1721,15 @@
               <a:t> </a:t>
             </a:r>
             <a:r>
-              <a:rPr lang="de-CH" dirty="0" err="1" smtClean="0"/>
+              <a:rPr lang="de-CH" dirty="0" err="1"/>
               <a:t>Kommands</a:t>
             </a:r>
             <a:r>
-              <a:rPr lang="de-CH" dirty="0" smtClean="0"/>
+              <a:rPr lang="de-CH" dirty="0"/>
               <a:t>			</a:t>
             </a:r>
             <a:r>
-              <a:rPr lang="de-CH" dirty="0" err="1" smtClean="0"/>
+              <a:rPr lang="de-CH" dirty="0" err="1"/>
               <a:t>Ghenzi</a:t>
             </a:r>
             <a:endParaRPr lang="de-CH" dirty="0"/>
@@ -1676,11 +1754,7 @@
             </a:pPr>
             <a:r>
               <a:rPr lang="de-CH" dirty="0"/>
-              <a:t>Template: </a:t>
-            </a:r>
-            <a:r>
-              <a:rPr lang="de-CH" dirty="0" smtClean="0"/>
-              <a:t>					Martin</a:t>
+              <a:t>Template: 					Martin</a:t>
             </a:r>
           </a:p>
           <a:p>
@@ -1769,10 +1843,9 @@
           <a:lstStyle/>
           <a:p>
             <a:r>
-              <a:rPr lang="de-CH" dirty="0" smtClean="0"/>
+              <a:rPr lang="de-CH" dirty="0"/>
               <a:t>Philippe</a:t>
             </a:r>
-            <a:endParaRPr lang="de-CH" dirty="0"/>
           </a:p>
         </p:txBody>
       </p:sp>
@@ -1857,9 +1930,235 @@
           <a:lstStyle/>
           <a:p>
             <a:r>
-              <a:rPr lang="de-CH" dirty="0" smtClean="0"/>
+              <a:rPr lang="de-CH" dirty="0"/>
               <a:t>Christian</a:t>
             </a:r>
+          </a:p>
+          <a:p>
+            <a:r>
+              <a:rPr lang="de-CH" dirty="0"/>
+              <a:t>-</a:t>
+            </a:r>
+            <a:r>
+              <a:rPr lang="de-CH" baseline="0" dirty="0"/>
+              <a:t> </a:t>
+            </a:r>
+            <a:r>
+              <a:rPr lang="de-CH" baseline="0" dirty="0" err="1"/>
+              <a:t>Testing</a:t>
+            </a:r>
+            <a:endParaRPr lang="de-CH" dirty="0"/>
+          </a:p>
+          <a:p>
+            <a:pPr marL="628650" lvl="1" indent="-171450">
+              <a:buFontTx/>
+              <a:buChar char="-"/>
+            </a:pPr>
+            <a:r>
+              <a:rPr lang="de-CH" dirty="0" err="1"/>
+              <a:t>Junit</a:t>
+            </a:r>
+            <a:endParaRPr lang="de-CH" dirty="0"/>
+          </a:p>
+          <a:p>
+            <a:pPr marL="628650" lvl="1" indent="-171450">
+              <a:buFontTx/>
+              <a:buChar char="-"/>
+            </a:pPr>
+            <a:r>
+              <a:rPr lang="de-CH" baseline="0" dirty="0"/>
+              <a:t>Tests wie im Selbststudium (</a:t>
+            </a:r>
+            <a:r>
+              <a:rPr lang="de-CH" baseline="0" dirty="0" err="1"/>
+              <a:t>assertTrue</a:t>
+            </a:r>
+            <a:r>
+              <a:rPr lang="de-CH" baseline="0" dirty="0"/>
+              <a:t>) </a:t>
+            </a:r>
+          </a:p>
+          <a:p>
+            <a:pPr marL="628650" marR="0" lvl="1" indent="-171450" algn="l" defTabSz="914400" rtl="0" eaLnBrk="1" fontAlgn="auto" latinLnBrk="0" hangingPunct="1">
+              <a:lnSpc>
+                <a:spcPct val="100000"/>
+              </a:lnSpc>
+              <a:spcBef>
+                <a:spcPts val="0"/>
+              </a:spcBef>
+              <a:spcAft>
+                <a:spcPts val="0"/>
+              </a:spcAft>
+              <a:buClrTx/>
+              <a:buSzTx/>
+              <a:buFontTx/>
+              <a:buChar char="-"/>
+              <a:tabLst/>
+              <a:defRPr/>
+            </a:pPr>
+            <a:r>
+              <a:rPr lang="de-CH" baseline="0" dirty="0"/>
+              <a:t>Keine gravierenden Fehler, nur überflüssiger Code entfernt</a:t>
+            </a:r>
+          </a:p>
+          <a:p>
+            <a:pPr marL="1085850" lvl="2" indent="-171450">
+              <a:buFontTx/>
+              <a:buChar char="-"/>
+            </a:pPr>
+            <a:endParaRPr lang="de-CH" baseline="0" dirty="0"/>
+          </a:p>
+          <a:p>
+            <a:pPr marL="628650" lvl="1" indent="-171450">
+              <a:buFontTx/>
+              <a:buChar char="-"/>
+            </a:pPr>
+            <a:r>
+              <a:rPr lang="de-CH" baseline="0" dirty="0"/>
+              <a:t>Code-</a:t>
+            </a:r>
+            <a:r>
+              <a:rPr lang="de-CH" baseline="0" dirty="0" err="1"/>
+              <a:t>Coverage</a:t>
+            </a:r>
+            <a:r>
+              <a:rPr lang="de-CH" baseline="0" dirty="0"/>
+              <a:t> mit </a:t>
+            </a:r>
+            <a:r>
+              <a:rPr lang="de-CH" baseline="0" dirty="0" err="1"/>
+              <a:t>EclEmma</a:t>
+            </a:r>
+            <a:r>
+              <a:rPr lang="de-CH" baseline="0" dirty="0"/>
+              <a:t> </a:t>
+            </a:r>
+          </a:p>
+          <a:p>
+            <a:pPr marL="628650" lvl="1" indent="-171450">
+              <a:buFontTx/>
+              <a:buChar char="-"/>
+            </a:pPr>
+            <a:r>
+              <a:rPr lang="de-CH" baseline="0" dirty="0"/>
+              <a:t>auch wie im Selbststudium</a:t>
+            </a:r>
+          </a:p>
+          <a:p>
+            <a:pPr marL="628650" lvl="1" indent="-171450">
+              <a:buFontTx/>
+              <a:buChar char="-"/>
+            </a:pPr>
+            <a:r>
+              <a:rPr lang="de-CH" baseline="0" dirty="0"/>
+              <a:t>Schlechte </a:t>
+            </a:r>
+            <a:r>
+              <a:rPr lang="de-CH" baseline="0" dirty="0" err="1"/>
+              <a:t>Coverage</a:t>
+            </a:r>
+            <a:r>
+              <a:rPr lang="de-CH" baseline="0" dirty="0"/>
+              <a:t> wegen GUI, </a:t>
+            </a:r>
+            <a:r>
+              <a:rPr lang="de-CH" baseline="0" dirty="0" err="1"/>
+              <a:t>Enums</a:t>
+            </a:r>
+            <a:endParaRPr lang="de-CH" baseline="0" dirty="0"/>
+          </a:p>
+          <a:p>
+            <a:pPr marL="1085850" lvl="2" indent="-171450">
+              <a:buFontTx/>
+              <a:buChar char="-"/>
+            </a:pPr>
+            <a:endParaRPr lang="de-CH" baseline="0" dirty="0"/>
+          </a:p>
+          <a:p>
+            <a:pPr marL="171450" lvl="0" indent="-171450">
+              <a:buFontTx/>
+              <a:buChar char="-"/>
+            </a:pPr>
+            <a:r>
+              <a:rPr lang="de-CH" baseline="0" dirty="0"/>
+              <a:t>Metrik</a:t>
+            </a:r>
+          </a:p>
+          <a:p>
+            <a:pPr marL="628650" lvl="1" indent="-171450">
+              <a:buFontTx/>
+              <a:buChar char="-"/>
+            </a:pPr>
+            <a:r>
+              <a:rPr lang="de-CH" baseline="0" dirty="0"/>
+              <a:t>Tests mit Borland </a:t>
+            </a:r>
+            <a:r>
+              <a:rPr lang="de-CH" baseline="0" dirty="0" err="1"/>
+              <a:t>Together</a:t>
+            </a:r>
+            <a:endParaRPr lang="de-CH" baseline="0" dirty="0"/>
+          </a:p>
+          <a:p>
+            <a:pPr marL="628650" lvl="1" indent="-171450">
+              <a:buFontTx/>
+              <a:buChar char="-"/>
+            </a:pPr>
+            <a:r>
+              <a:rPr lang="de-CH" baseline="0" dirty="0"/>
+              <a:t>Schlechte </a:t>
+            </a:r>
+            <a:r>
+              <a:rPr lang="de-CH" baseline="0" dirty="0" err="1"/>
+              <a:t>Coupling</a:t>
+            </a:r>
+            <a:r>
+              <a:rPr lang="de-CH" baseline="0" dirty="0"/>
+              <a:t> </a:t>
+            </a:r>
+            <a:r>
+              <a:rPr lang="de-CH" baseline="0" dirty="0" err="1"/>
+              <a:t>Between</a:t>
+            </a:r>
+            <a:r>
+              <a:rPr lang="de-CH" baseline="0" dirty="0"/>
+              <a:t> Objects und </a:t>
+            </a:r>
+            <a:r>
+              <a:rPr lang="de-CH" baseline="0" dirty="0" err="1"/>
+              <a:t>Depth</a:t>
+            </a:r>
+            <a:r>
+              <a:rPr lang="de-CH" baseline="0" dirty="0"/>
+              <a:t> </a:t>
+            </a:r>
+            <a:r>
+              <a:rPr lang="de-CH" baseline="0" dirty="0" err="1"/>
+              <a:t>of</a:t>
+            </a:r>
+            <a:r>
+              <a:rPr lang="de-CH" baseline="0" dirty="0"/>
+              <a:t> </a:t>
+            </a:r>
+            <a:r>
+              <a:rPr lang="de-CH" baseline="0" dirty="0" err="1"/>
+              <a:t>Inheritance</a:t>
+            </a:r>
+            <a:r>
+              <a:rPr lang="de-CH" baseline="0" dirty="0"/>
+              <a:t> </a:t>
+            </a:r>
+            <a:r>
+              <a:rPr lang="de-CH" baseline="0" dirty="0" err="1"/>
+              <a:t>Hierarchy</a:t>
+            </a:r>
+            <a:endParaRPr lang="de-CH" baseline="0" dirty="0"/>
+          </a:p>
+          <a:p>
+            <a:pPr marL="628650" lvl="1" indent="-171450">
+              <a:buFontTx/>
+              <a:buChar char="-"/>
+            </a:pPr>
             <a:endParaRPr lang="de-CH" dirty="0"/>
           </a:p>
         </p:txBody>
@@ -1961,7 +2260,7 @@
           </a:lstStyle>
           <a:p>
             <a:r>
-              <a:rPr lang="de-DE" smtClean="0"/>
+              <a:rPr lang="de-DE"/>
               <a:t>Titelmasterformat durch Klicken bearbeiten</a:t>
             </a:r>
             <a:endParaRPr lang="en-US" dirty="0"/>
@@ -2034,7 +2333,7 @@
           </a:lstStyle>
           <a:p>
             <a:r>
-              <a:rPr lang="de-DE" smtClean="0"/>
+              <a:rPr lang="de-DE"/>
               <a:t>Formatvorlage des Untertitelmasters durch Klicken bearbeiten</a:t>
             </a:r>
             <a:endParaRPr lang="en-US" dirty="0"/>
@@ -2068,7 +2367,7 @@
           <a:p>
             <a:fld id="{EDF032E5-4712-4CD3-A297-BA927FE98535}" type="datetimeFigureOut">
               <a:rPr lang="de-CH" smtClean="0"/>
-              <a:t>06.06.2016</a:t>
+              <a:t>07.06.2016</a:t>
             </a:fld>
             <a:endParaRPr lang="de-CH"/>
           </a:p>
@@ -2220,7 +2519,7 @@
           <a:lstStyle/>
           <a:p>
             <a:r>
-              <a:rPr lang="de-DE" smtClean="0"/>
+              <a:rPr lang="de-DE"/>
               <a:t>Titelmasterformat durch Klicken bearbeiten</a:t>
             </a:r>
             <a:endParaRPr lang="en-US" dirty="0"/>
@@ -2244,35 +2543,35 @@
           <a:p>
             <a:pPr lvl="0"/>
             <a:r>
-              <a:rPr lang="de-DE" smtClean="0"/>
+              <a:rPr lang="de-DE"/>
               <a:t>Textmasterformat bearbeiten</a:t>
             </a:r>
           </a:p>
           <a:p>
             <a:pPr lvl="1"/>
             <a:r>
-              <a:rPr lang="de-DE" smtClean="0"/>
+              <a:rPr lang="de-DE"/>
               <a:t>Zweite Ebene</a:t>
             </a:r>
           </a:p>
           <a:p>
             <a:pPr lvl="2"/>
             <a:r>
-              <a:rPr lang="de-DE" smtClean="0"/>
+              <a:rPr lang="de-DE"/>
               <a:t>Dritte Ebene</a:t>
             </a:r>
           </a:p>
           <a:p>
             <a:pPr lvl="3"/>
             <a:r>
-              <a:rPr lang="de-DE" smtClean="0"/>
+              <a:rPr lang="de-DE"/>
               <a:t>Vierte Ebene</a:t>
             </a:r>
           </a:p>
           <a:p>
             <a:pPr lvl="4"/>
             <a:r>
-              <a:rPr lang="de-DE" smtClean="0"/>
+              <a:rPr lang="de-DE"/>
               <a:t>Fünfte Ebene</a:t>
             </a:r>
             <a:endParaRPr lang="en-US" dirty="0"/>
@@ -2296,7 +2595,7 @@
           <a:p>
             <a:fld id="{EDF032E5-4712-4CD3-A297-BA927FE98535}" type="datetimeFigureOut">
               <a:rPr lang="de-CH" smtClean="0"/>
-              <a:t>06.06.2016</a:t>
+              <a:t>07.06.2016</a:t>
             </a:fld>
             <a:endParaRPr lang="de-CH"/>
           </a:p>
@@ -2395,7 +2694,7 @@
           <a:lstStyle/>
           <a:p>
             <a:r>
-              <a:rPr lang="de-DE" smtClean="0"/>
+              <a:rPr lang="de-DE"/>
               <a:t>Titelmasterformat durch Klicken bearbeiten</a:t>
             </a:r>
             <a:endParaRPr lang="en-US" dirty="0"/>
@@ -2424,35 +2723,35 @@
           <a:p>
             <a:pPr lvl="0"/>
             <a:r>
-              <a:rPr lang="de-DE" smtClean="0"/>
+              <a:rPr lang="de-DE"/>
               <a:t>Textmasterformat bearbeiten</a:t>
             </a:r>
           </a:p>
           <a:p>
             <a:pPr lvl="1"/>
             <a:r>
-              <a:rPr lang="de-DE" smtClean="0"/>
+              <a:rPr lang="de-DE"/>
               <a:t>Zweite Ebene</a:t>
             </a:r>
           </a:p>
           <a:p>
             <a:pPr lvl="2"/>
             <a:r>
-              <a:rPr lang="de-DE" smtClean="0"/>
+              <a:rPr lang="de-DE"/>
               <a:t>Dritte Ebene</a:t>
             </a:r>
           </a:p>
           <a:p>
             <a:pPr lvl="3"/>
             <a:r>
-              <a:rPr lang="de-DE" smtClean="0"/>
+              <a:rPr lang="de-DE"/>
               <a:t>Vierte Ebene</a:t>
             </a:r>
           </a:p>
           <a:p>
             <a:pPr lvl="4"/>
             <a:r>
-              <a:rPr lang="de-DE" smtClean="0"/>
+              <a:rPr lang="de-DE"/>
               <a:t>Fünfte Ebene</a:t>
             </a:r>
             <a:endParaRPr lang="en-US" dirty="0"/>
@@ -2476,7 +2775,7 @@
           <a:p>
             <a:fld id="{EDF032E5-4712-4CD3-A297-BA927FE98535}" type="datetimeFigureOut">
               <a:rPr lang="de-CH" smtClean="0"/>
-              <a:t>06.06.2016</a:t>
+              <a:t>07.06.2016</a:t>
             </a:fld>
             <a:endParaRPr lang="de-CH"/>
           </a:p>
@@ -2570,7 +2869,7 @@
           <a:lstStyle/>
           <a:p>
             <a:r>
-              <a:rPr lang="de-DE" smtClean="0"/>
+              <a:rPr lang="de-DE"/>
               <a:t>Titelmasterformat durch Klicken bearbeiten</a:t>
             </a:r>
             <a:endParaRPr lang="en-US" dirty="0"/>
@@ -2594,35 +2893,35 @@
           <a:p>
             <a:pPr lvl="0"/>
             <a:r>
-              <a:rPr lang="de-DE" smtClean="0"/>
+              <a:rPr lang="de-DE"/>
               <a:t>Textmasterformat bearbeiten</a:t>
             </a:r>
           </a:p>
           <a:p>
             <a:pPr lvl="1"/>
             <a:r>
-              <a:rPr lang="de-DE" smtClean="0"/>
+              <a:rPr lang="de-DE"/>
               <a:t>Zweite Ebene</a:t>
             </a:r>
           </a:p>
           <a:p>
             <a:pPr lvl="2"/>
             <a:r>
-              <a:rPr lang="de-DE" smtClean="0"/>
+              <a:rPr lang="de-DE"/>
               <a:t>Dritte Ebene</a:t>
             </a:r>
           </a:p>
           <a:p>
             <a:pPr lvl="3"/>
             <a:r>
-              <a:rPr lang="de-DE" smtClean="0"/>
+              <a:rPr lang="de-DE"/>
               <a:t>Vierte Ebene</a:t>
             </a:r>
           </a:p>
           <a:p>
             <a:pPr lvl="4"/>
             <a:r>
-              <a:rPr lang="de-DE" smtClean="0"/>
+              <a:rPr lang="de-DE"/>
               <a:t>Fünfte Ebene</a:t>
             </a:r>
             <a:endParaRPr lang="en-US" dirty="0"/>
@@ -2646,7 +2945,7 @@
           <a:p>
             <a:fld id="{EDF032E5-4712-4CD3-A297-BA927FE98535}" type="datetimeFigureOut">
               <a:rPr lang="de-CH" smtClean="0"/>
-              <a:t>06.06.2016</a:t>
+              <a:t>07.06.2016</a:t>
             </a:fld>
             <a:endParaRPr lang="de-CH"/>
           </a:p>
@@ -2754,7 +3053,7 @@
           </a:lstStyle>
           <a:p>
             <a:r>
-              <a:rPr lang="de-DE" smtClean="0"/>
+              <a:rPr lang="de-DE"/>
               <a:t>Titelmasterformat durch Klicken bearbeiten</a:t>
             </a:r>
             <a:endParaRPr lang="en-US" dirty="0"/>
@@ -2877,7 +3176,7 @@
           <a:p>
             <a:pPr lvl="0"/>
             <a:r>
-              <a:rPr lang="de-DE" smtClean="0"/>
+              <a:rPr lang="de-DE"/>
               <a:t>Textmasterformat bearbeiten</a:t>
             </a:r>
           </a:p>
@@ -2900,7 +3199,7 @@
           <a:p>
             <a:fld id="{EDF032E5-4712-4CD3-A297-BA927FE98535}" type="datetimeFigureOut">
               <a:rPr lang="de-CH" smtClean="0"/>
-              <a:t>06.06.2016</a:t>
+              <a:t>07.06.2016</a:t>
             </a:fld>
             <a:endParaRPr lang="de-CH"/>
           </a:p>
@@ -3032,7 +3331,7 @@
           <a:lstStyle/>
           <a:p>
             <a:r>
-              <a:rPr lang="de-DE" smtClean="0"/>
+              <a:rPr lang="de-DE"/>
               <a:t>Titelmasterformat durch Klicken bearbeiten</a:t>
             </a:r>
             <a:endParaRPr lang="en-US" dirty="0"/>
@@ -3089,35 +3388,35 @@
           <a:p>
             <a:pPr lvl="0"/>
             <a:r>
-              <a:rPr lang="de-DE" smtClean="0"/>
+              <a:rPr lang="de-DE"/>
               <a:t>Textmasterformat bearbeiten</a:t>
             </a:r>
           </a:p>
           <a:p>
             <a:pPr lvl="1"/>
             <a:r>
-              <a:rPr lang="de-DE" smtClean="0"/>
+              <a:rPr lang="de-DE"/>
               <a:t>Zweite Ebene</a:t>
             </a:r>
           </a:p>
           <a:p>
             <a:pPr lvl="2"/>
             <a:r>
-              <a:rPr lang="de-DE" smtClean="0"/>
+              <a:rPr lang="de-DE"/>
               <a:t>Dritte Ebene</a:t>
             </a:r>
           </a:p>
           <a:p>
             <a:pPr lvl="3"/>
             <a:r>
-              <a:rPr lang="de-DE" smtClean="0"/>
+              <a:rPr lang="de-DE"/>
               <a:t>Vierte Ebene</a:t>
             </a:r>
           </a:p>
           <a:p>
             <a:pPr lvl="4"/>
             <a:r>
-              <a:rPr lang="de-DE" smtClean="0"/>
+              <a:rPr lang="de-DE"/>
               <a:t>Fünfte Ebene</a:t>
             </a:r>
             <a:endParaRPr lang="en-US" dirty="0"/>
@@ -3174,35 +3473,35 @@
           <a:p>
             <a:pPr lvl="0"/>
             <a:r>
-              <a:rPr lang="de-DE" smtClean="0"/>
+              <a:rPr lang="de-DE"/>
               <a:t>Textmasterformat bearbeiten</a:t>
             </a:r>
           </a:p>
           <a:p>
             <a:pPr lvl="1"/>
             <a:r>
-              <a:rPr lang="de-DE" smtClean="0"/>
+              <a:rPr lang="de-DE"/>
               <a:t>Zweite Ebene</a:t>
             </a:r>
           </a:p>
           <a:p>
             <a:pPr lvl="2"/>
             <a:r>
-              <a:rPr lang="de-DE" smtClean="0"/>
+              <a:rPr lang="de-DE"/>
               <a:t>Dritte Ebene</a:t>
             </a:r>
           </a:p>
           <a:p>
             <a:pPr lvl="3"/>
             <a:r>
-              <a:rPr lang="de-DE" smtClean="0"/>
+              <a:rPr lang="de-DE"/>
               <a:t>Vierte Ebene</a:t>
             </a:r>
           </a:p>
           <a:p>
             <a:pPr lvl="4"/>
             <a:r>
-              <a:rPr lang="de-DE" smtClean="0"/>
+              <a:rPr lang="de-DE"/>
               <a:t>Fünfte Ebene</a:t>
             </a:r>
             <a:endParaRPr lang="en-US" dirty="0"/>
@@ -3226,7 +3525,7 @@
           <a:p>
             <a:fld id="{EDF032E5-4712-4CD3-A297-BA927FE98535}" type="datetimeFigureOut">
               <a:rPr lang="de-CH" smtClean="0"/>
-              <a:t>06.06.2016</a:t>
+              <a:t>07.06.2016</a:t>
             </a:fld>
             <a:endParaRPr lang="de-CH"/>
           </a:p>
@@ -3320,7 +3619,7 @@
           <a:lstStyle/>
           <a:p>
             <a:r>
-              <a:rPr lang="de-DE" smtClean="0"/>
+              <a:rPr lang="de-DE"/>
               <a:t>Titelmasterformat durch Klicken bearbeiten</a:t>
             </a:r>
             <a:endParaRPr lang="en-US" dirty="0"/>
@@ -3395,7 +3694,7 @@
           <a:p>
             <a:pPr lvl="0"/>
             <a:r>
-              <a:rPr lang="de-DE" smtClean="0"/>
+              <a:rPr lang="de-DE"/>
               <a:t>Textmasterformat bearbeiten</a:t>
             </a:r>
           </a:p>
@@ -3451,35 +3750,35 @@
           <a:p>
             <a:pPr lvl="0"/>
             <a:r>
-              <a:rPr lang="de-DE" smtClean="0"/>
+              <a:rPr lang="de-DE"/>
               <a:t>Textmasterformat bearbeiten</a:t>
             </a:r>
           </a:p>
           <a:p>
             <a:pPr lvl="1"/>
             <a:r>
-              <a:rPr lang="de-DE" smtClean="0"/>
+              <a:rPr lang="de-DE"/>
               <a:t>Zweite Ebene</a:t>
             </a:r>
           </a:p>
           <a:p>
             <a:pPr lvl="2"/>
             <a:r>
-              <a:rPr lang="de-DE" smtClean="0"/>
+              <a:rPr lang="de-DE"/>
               <a:t>Dritte Ebene</a:t>
             </a:r>
           </a:p>
           <a:p>
             <a:pPr lvl="3"/>
             <a:r>
-              <a:rPr lang="de-DE" smtClean="0"/>
+              <a:rPr lang="de-DE"/>
               <a:t>Vierte Ebene</a:t>
             </a:r>
           </a:p>
           <a:p>
             <a:pPr lvl="4"/>
             <a:r>
-              <a:rPr lang="de-DE" smtClean="0"/>
+              <a:rPr lang="de-DE"/>
               <a:t>Fünfte Ebene</a:t>
             </a:r>
             <a:endParaRPr lang="en-US" dirty="0"/>
@@ -3569,7 +3868,7 @@
               <a:buNone/>
             </a:pPr>
             <a:r>
-              <a:rPr lang="de-DE" smtClean="0"/>
+              <a:rPr lang="de-DE"/>
               <a:t>Textmasterformat bearbeiten</a:t>
             </a:r>
           </a:p>
@@ -3625,35 +3924,35 @@
           <a:p>
             <a:pPr lvl="0"/>
             <a:r>
-              <a:rPr lang="de-DE" smtClean="0"/>
+              <a:rPr lang="de-DE"/>
               <a:t>Textmasterformat bearbeiten</a:t>
             </a:r>
           </a:p>
           <a:p>
             <a:pPr lvl="1"/>
             <a:r>
-              <a:rPr lang="de-DE" smtClean="0"/>
+              <a:rPr lang="de-DE"/>
               <a:t>Zweite Ebene</a:t>
             </a:r>
           </a:p>
           <a:p>
             <a:pPr lvl="2"/>
             <a:r>
-              <a:rPr lang="de-DE" smtClean="0"/>
+              <a:rPr lang="de-DE"/>
               <a:t>Dritte Ebene</a:t>
             </a:r>
           </a:p>
           <a:p>
             <a:pPr lvl="3"/>
             <a:r>
-              <a:rPr lang="de-DE" smtClean="0"/>
+              <a:rPr lang="de-DE"/>
               <a:t>Vierte Ebene</a:t>
             </a:r>
           </a:p>
           <a:p>
             <a:pPr lvl="4"/>
             <a:r>
-              <a:rPr lang="de-DE" smtClean="0"/>
+              <a:rPr lang="de-DE"/>
               <a:t>Fünfte Ebene</a:t>
             </a:r>
             <a:endParaRPr lang="en-US" dirty="0"/>
@@ -3677,7 +3976,7 @@
           <a:p>
             <a:fld id="{EDF032E5-4712-4CD3-A297-BA927FE98535}" type="datetimeFigureOut">
               <a:rPr lang="de-CH" smtClean="0"/>
-              <a:t>06.06.2016</a:t>
+              <a:t>07.06.2016</a:t>
             </a:fld>
             <a:endParaRPr lang="de-CH"/>
           </a:p>
@@ -3771,7 +4070,7 @@
           <a:lstStyle/>
           <a:p>
             <a:r>
-              <a:rPr lang="de-DE" smtClean="0"/>
+              <a:rPr lang="de-DE"/>
               <a:t>Titelmasterformat durch Klicken bearbeiten</a:t>
             </a:r>
             <a:endParaRPr lang="en-US" dirty="0"/>
@@ -3795,7 +4094,7 @@
           <a:p>
             <a:fld id="{EDF032E5-4712-4CD3-A297-BA927FE98535}" type="datetimeFigureOut">
               <a:rPr lang="de-CH" smtClean="0"/>
-              <a:t>06.06.2016</a:t>
+              <a:t>07.06.2016</a:t>
             </a:fld>
             <a:endParaRPr lang="de-CH"/>
           </a:p>
@@ -3890,7 +4189,7 @@
           <a:p>
             <a:fld id="{EDF032E5-4712-4CD3-A297-BA927FE98535}" type="datetimeFigureOut">
               <a:rPr lang="de-CH" smtClean="0"/>
-              <a:t>06.06.2016</a:t>
+              <a:t>07.06.2016</a:t>
             </a:fld>
             <a:endParaRPr lang="de-CH"/>
           </a:p>
@@ -3995,7 +4294,7 @@
           </a:lstStyle>
           <a:p>
             <a:r>
-              <a:rPr lang="de-DE" smtClean="0"/>
+              <a:rPr lang="de-DE"/>
               <a:t>Titelmasterformat durch Klicken bearbeiten</a:t>
             </a:r>
             <a:endParaRPr lang="en-US" dirty="0"/>
@@ -4052,35 +4351,35 @@
           <a:p>
             <a:pPr lvl="0"/>
             <a:r>
-              <a:rPr lang="de-DE" smtClean="0"/>
+              <a:rPr lang="de-DE"/>
               <a:t>Textmasterformat bearbeiten</a:t>
             </a:r>
           </a:p>
           <a:p>
             <a:pPr lvl="1"/>
             <a:r>
-              <a:rPr lang="de-DE" smtClean="0"/>
+              <a:rPr lang="de-DE"/>
               <a:t>Zweite Ebene</a:t>
             </a:r>
           </a:p>
           <a:p>
             <a:pPr lvl="2"/>
             <a:r>
-              <a:rPr lang="de-DE" smtClean="0"/>
+              <a:rPr lang="de-DE"/>
               <a:t>Dritte Ebene</a:t>
             </a:r>
           </a:p>
           <a:p>
             <a:pPr lvl="3"/>
             <a:r>
-              <a:rPr lang="de-DE" smtClean="0"/>
+              <a:rPr lang="de-DE"/>
               <a:t>Vierte Ebene</a:t>
             </a:r>
           </a:p>
           <a:p>
             <a:pPr lvl="4"/>
             <a:r>
-              <a:rPr lang="de-DE" smtClean="0"/>
+              <a:rPr lang="de-DE"/>
               <a:t>Fünfte Ebene</a:t>
             </a:r>
             <a:endParaRPr lang="en-US" dirty="0"/>
@@ -4154,7 +4453,7 @@
           <a:p>
             <a:pPr lvl="0"/>
             <a:r>
-              <a:rPr lang="de-DE" smtClean="0"/>
+              <a:rPr lang="de-DE"/>
               <a:t>Textmasterformat bearbeiten</a:t>
             </a:r>
           </a:p>
@@ -4177,7 +4476,7 @@
           <a:p>
             <a:fld id="{EDF032E5-4712-4CD3-A297-BA927FE98535}" type="datetimeFigureOut">
               <a:rPr lang="de-CH" smtClean="0"/>
-              <a:t>06.06.2016</a:t>
+              <a:t>07.06.2016</a:t>
             </a:fld>
             <a:endParaRPr lang="de-CH"/>
           </a:p>
@@ -4324,7 +4623,7 @@
           </a:lstStyle>
           <a:p>
             <a:r>
-              <a:rPr lang="de-DE" smtClean="0"/>
+              <a:rPr lang="de-DE"/>
               <a:t>Titelmasterformat durch Klicken bearbeiten</a:t>
             </a:r>
             <a:endParaRPr lang="en-US" dirty="0"/>
@@ -4399,7 +4698,7 @@
           </a:lstStyle>
           <a:p>
             <a:r>
-              <a:rPr lang="de-DE" smtClean="0"/>
+              <a:rPr lang="de-DE"/>
               <a:t>Bild durch Klicken auf Symbol hinzufügen</a:t>
             </a:r>
             <a:endParaRPr lang="en-US" dirty="0"/>
@@ -4479,7 +4778,7 @@
           <a:p>
             <a:pPr lvl="0"/>
             <a:r>
-              <a:rPr lang="de-DE" smtClean="0"/>
+              <a:rPr lang="de-DE"/>
               <a:t>Textmasterformat bearbeiten</a:t>
             </a:r>
           </a:p>
@@ -4502,7 +4801,7 @@
           <a:p>
             <a:fld id="{EDF032E5-4712-4CD3-A297-BA927FE98535}" type="datetimeFigureOut">
               <a:rPr lang="de-CH" smtClean="0"/>
-              <a:t>06.06.2016</a:t>
+              <a:t>07.06.2016</a:t>
             </a:fld>
             <a:endParaRPr lang="de-CH"/>
           </a:p>
@@ -4651,7 +4950,7 @@
           <a:lstStyle/>
           <a:p>
             <a:r>
-              <a:rPr lang="de-DE" smtClean="0"/>
+              <a:rPr lang="de-DE"/>
               <a:t>Titelmasterformat durch Klicken bearbeiten</a:t>
             </a:r>
             <a:endParaRPr lang="en-US" dirty="0"/>
@@ -4685,35 +4984,35 @@
           <a:p>
             <a:pPr lvl="0"/>
             <a:r>
-              <a:rPr lang="de-DE" smtClean="0"/>
+              <a:rPr lang="de-DE"/>
               <a:t>Textmasterformat bearbeiten</a:t>
             </a:r>
           </a:p>
           <a:p>
             <a:pPr lvl="1"/>
             <a:r>
-              <a:rPr lang="de-DE" smtClean="0"/>
+              <a:rPr lang="de-DE"/>
               <a:t>Zweite Ebene</a:t>
             </a:r>
           </a:p>
           <a:p>
             <a:pPr lvl="2"/>
             <a:r>
-              <a:rPr lang="de-DE" smtClean="0"/>
+              <a:rPr lang="de-DE"/>
               <a:t>Dritte Ebene</a:t>
             </a:r>
           </a:p>
           <a:p>
             <a:pPr lvl="3"/>
             <a:r>
-              <a:rPr lang="de-DE" smtClean="0"/>
+              <a:rPr lang="de-DE"/>
               <a:t>Vierte Ebene</a:t>
             </a:r>
           </a:p>
           <a:p>
             <a:pPr lvl="4"/>
             <a:r>
-              <a:rPr lang="de-DE" smtClean="0"/>
+              <a:rPr lang="de-DE"/>
               <a:t>Fünfte Ebene</a:t>
             </a:r>
             <a:endParaRPr lang="en-US" dirty="0"/>
@@ -4756,7 +5055,7 @@
           <a:p>
             <a:fld id="{EDF032E5-4712-4CD3-A297-BA927FE98535}" type="datetimeFigureOut">
               <a:rPr lang="de-CH" smtClean="0"/>
-              <a:t>06.06.2016</a:t>
+              <a:t>07.06.2016</a:t>
             </a:fld>
             <a:endParaRPr lang="de-CH"/>
           </a:p>
@@ -5307,25 +5606,18 @@
   <p:clrMapOvr>
     <a:masterClrMapping/>
   </p:clrMapOvr>
-  <mc:AlternateContent xmlns:mc="http://schemas.openxmlformats.org/markup-compatibility/2006">
-    <mc:Choice xmlns:p14="http://schemas.microsoft.com/office/powerpoint/2010/main" Requires="p14">
+  <mc:AlternateContent xmlns:mc="http://schemas.openxmlformats.org/markup-compatibility/2006" xmlns:p14="http://schemas.microsoft.com/office/powerpoint/2010/main">
+    <mc:Choice Requires="p14">
       <p:transition spd="med" p14:dur="700">
         <p:fade/>
       </p:transition>
     </mc:Choice>
-    <mc:Fallback>
+    <mc:Fallback xmlns="">
       <p:transition spd="med">
         <p:fade/>
       </p:transition>
     </mc:Fallback>
   </mc:AlternateContent>
-  <p:timing>
-    <p:tnLst>
-      <p:par>
-        <p:cTn id="1" dur="indefinite" restart="never" nodeType="tmRoot"/>
-      </p:par>
-    </p:tnLst>
-  </p:timing>
 </p:sld>
 </file>
 
@@ -5386,91 +5678,91 @@
           <a:lstStyle/>
           <a:p>
             <a:r>
-              <a:rPr lang="de-CH" dirty="0" err="1" smtClean="0"/>
+              <a:rPr lang="de-CH" dirty="0" err="1"/>
               <a:t>Scrum</a:t>
             </a:r>
-            <a:endParaRPr lang="de-CH" dirty="0" smtClean="0"/>
+            <a:endParaRPr lang="de-CH" dirty="0"/>
           </a:p>
           <a:p>
             <a:pPr lvl="1"/>
             <a:r>
-              <a:rPr lang="de-CH" dirty="0" smtClean="0"/>
+              <a:rPr lang="de-CH" dirty="0"/>
               <a:t>Grundplanung</a:t>
             </a:r>
           </a:p>
           <a:p>
             <a:pPr lvl="1"/>
             <a:r>
-              <a:rPr lang="de-CH" dirty="0" smtClean="0"/>
+              <a:rPr lang="de-CH" dirty="0"/>
               <a:t>Entwicklung parallel </a:t>
             </a:r>
             <a:r>
-              <a:rPr lang="de-CH" dirty="0" smtClean="0">
+              <a:rPr lang="de-CH" dirty="0">
                 <a:sym typeface="Wingdings" panose="05000000000000000000" pitchFamily="2" charset="2"/>
               </a:rPr>
               <a:t> gute Kommunikation zwingend notwendig</a:t>
             </a:r>
-            <a:endParaRPr lang="de-CH" dirty="0" smtClean="0"/>
+            <a:endParaRPr lang="de-CH" dirty="0"/>
           </a:p>
           <a:p>
             <a:pPr lvl="1"/>
             <a:r>
-              <a:rPr lang="de-CH" dirty="0" smtClean="0"/>
+              <a:rPr lang="de-CH" dirty="0"/>
               <a:t>Gezieltes Einsetzen der Stärken und Fähigkeiten der Teammitglieder</a:t>
             </a:r>
           </a:p>
           <a:p>
             <a:pPr lvl="1"/>
             <a:r>
-              <a:rPr lang="de-CH" dirty="0" smtClean="0"/>
+              <a:rPr lang="de-CH" dirty="0"/>
               <a:t>Schwierigkeiten beim Erstellen des </a:t>
             </a:r>
             <a:r>
-              <a:rPr lang="de-CH" dirty="0" err="1" smtClean="0"/>
+              <a:rPr lang="de-CH" dirty="0" err="1"/>
               <a:t>Product</a:t>
             </a:r>
             <a:r>
-              <a:rPr lang="de-CH" dirty="0" smtClean="0"/>
+              <a:rPr lang="de-CH" dirty="0"/>
               <a:t> &amp; Sprint </a:t>
             </a:r>
             <a:r>
-              <a:rPr lang="de-CH" dirty="0" err="1" smtClean="0"/>
+              <a:rPr lang="de-CH" dirty="0" err="1"/>
               <a:t>Backlogs</a:t>
             </a:r>
-            <a:endParaRPr lang="de-CH" dirty="0" smtClean="0"/>
+            <a:endParaRPr lang="de-CH" dirty="0"/>
           </a:p>
           <a:p>
             <a:pPr lvl="1"/>
             <a:r>
-              <a:rPr lang="de-CH" dirty="0" smtClean="0"/>
+              <a:rPr lang="de-CH" dirty="0"/>
               <a:t>«Daily </a:t>
             </a:r>
             <a:r>
-              <a:rPr lang="de-CH" dirty="0" err="1" smtClean="0"/>
+              <a:rPr lang="de-CH" dirty="0" err="1"/>
               <a:t>Scrum</a:t>
             </a:r>
             <a:r>
-              <a:rPr lang="de-CH" dirty="0" smtClean="0"/>
+              <a:rPr lang="de-CH" dirty="0"/>
               <a:t> Meeting» nicht «</a:t>
             </a:r>
             <a:r>
-              <a:rPr lang="de-CH" dirty="0" err="1" smtClean="0"/>
+              <a:rPr lang="de-CH" dirty="0" err="1"/>
               <a:t>daily</a:t>
             </a:r>
             <a:r>
-              <a:rPr lang="de-CH" dirty="0" smtClean="0"/>
+              <a:rPr lang="de-CH" dirty="0"/>
               <a:t>» durchgeführt</a:t>
             </a:r>
           </a:p>
           <a:p>
             <a:pPr lvl="1"/>
             <a:r>
-              <a:rPr lang="de-CH" dirty="0" smtClean="0"/>
+              <a:rPr lang="de-CH" dirty="0"/>
               <a:t>Projektabwicklung interessant</a:t>
             </a:r>
           </a:p>
           <a:p>
-            <a:endParaRPr lang="de-CH" dirty="0" smtClean="0"/>
+            <a:endParaRPr lang="de-CH" dirty="0"/>
           </a:p>
           <a:p>
             <a:endParaRPr lang="de-CH" dirty="0"/>
@@ -5487,25 +5779,18 @@
   <p:clrMapOvr>
     <a:masterClrMapping/>
   </p:clrMapOvr>
-  <mc:AlternateContent xmlns:mc="http://schemas.openxmlformats.org/markup-compatibility/2006">
-    <mc:Choice xmlns:p14="http://schemas.microsoft.com/office/powerpoint/2010/main" Requires="p14">
+  <mc:AlternateContent xmlns:mc="http://schemas.openxmlformats.org/markup-compatibility/2006" xmlns:p14="http://schemas.microsoft.com/office/powerpoint/2010/main">
+    <mc:Choice Requires="p14">
       <p:transition spd="med" p14:dur="700">
         <p:fade/>
       </p:transition>
     </mc:Choice>
-    <mc:Fallback>
+    <mc:Fallback xmlns="">
       <p:transition spd="med">
         <p:fade/>
       </p:transition>
     </mc:Fallback>
   </mc:AlternateContent>
-  <p:timing>
-    <p:tnLst>
-      <p:par>
-        <p:cTn id="1" dur="indefinite" restart="never" nodeType="tmRoot"/>
-      </p:par>
-    </p:tnLst>
-  </p:timing>
 </p:sld>
 </file>
 
@@ -5566,12 +5851,8 @@
           <a:lstStyle/>
           <a:p>
             <a:r>
-              <a:rPr lang="de-CH" dirty="0" smtClean="0"/>
-              <a:t>Verwendete </a:t>
-            </a:r>
-            <a:r>
-              <a:rPr lang="de-CH" dirty="0"/>
-              <a:t>Tools</a:t>
+              <a:rPr lang="de-CH" dirty="0"/>
+              <a:t>Verwendete Tools</a:t>
             </a:r>
           </a:p>
           <a:p>
@@ -5601,16 +5882,24 @@
           <a:p>
             <a:pPr lvl="1"/>
             <a:r>
-              <a:rPr lang="de-CH" dirty="0" err="1" smtClean="0"/>
+              <a:rPr lang="de-CH" dirty="0" err="1"/>
               <a:t>Junit</a:t>
             </a:r>
             <a:r>
-              <a:rPr lang="de-CH" dirty="0" smtClean="0"/>
+              <a:rPr lang="de-CH" dirty="0"/>
               <a:t>, </a:t>
             </a:r>
             <a:r>
-              <a:rPr lang="de-CH" dirty="0" err="1" smtClean="0"/>
+              <a:rPr lang="de-CH" dirty="0" err="1"/>
               <a:t>EclEmma</a:t>
+            </a:r>
+            <a:r>
+              <a:rPr lang="de-CH" dirty="0"/>
+              <a:t>, Borland </a:t>
+            </a:r>
+            <a:r>
+              <a:rPr lang="de-CH" dirty="0" err="1"/>
+              <a:t>Together</a:t>
             </a:r>
             <a:endParaRPr lang="de-CH" dirty="0"/>
           </a:p>
@@ -5626,25 +5915,18 @@
   <p:clrMapOvr>
     <a:masterClrMapping/>
   </p:clrMapOvr>
-  <mc:AlternateContent xmlns:mc="http://schemas.openxmlformats.org/markup-compatibility/2006">
-    <mc:Choice xmlns:p14="http://schemas.microsoft.com/office/powerpoint/2010/main" Requires="p14">
+  <mc:AlternateContent xmlns:mc="http://schemas.openxmlformats.org/markup-compatibility/2006" xmlns:p14="http://schemas.microsoft.com/office/powerpoint/2010/main">
+    <mc:Choice Requires="p14">
       <p:transition spd="med" p14:dur="700">
         <p:fade/>
       </p:transition>
     </mc:Choice>
-    <mc:Fallback>
+    <mc:Fallback xmlns="">
       <p:transition spd="med">
         <p:fade/>
       </p:transition>
     </mc:Fallback>
   </mc:AlternateContent>
-  <p:timing>
-    <p:tnLst>
-      <p:par>
-        <p:cTn id="1" dur="indefinite" restart="never" nodeType="tmRoot"/>
-      </p:par>
-    </p:tnLst>
-  </p:timing>
 </p:sld>
 </file>
 
@@ -5703,19 +5985,19 @@
           <a:lstStyle/>
           <a:p>
             <a:r>
-              <a:rPr lang="de-CH" dirty="0" smtClean="0"/>
+              <a:rPr lang="de-CH" dirty="0"/>
               <a:t>Wenig Planung erforderlich</a:t>
             </a:r>
           </a:p>
           <a:p>
             <a:r>
-              <a:rPr lang="de-CH" dirty="0" smtClean="0"/>
+              <a:rPr lang="de-CH" dirty="0"/>
               <a:t>Flexibilität</a:t>
             </a:r>
           </a:p>
           <a:p>
             <a:r>
-              <a:rPr lang="de-CH" dirty="0" smtClean="0"/>
+              <a:rPr lang="de-CH" dirty="0"/>
               <a:t>Entwickler viel Freiheit aber auch Eigenverantwortung</a:t>
             </a:r>
           </a:p>
@@ -5735,25 +6017,18 @@
   <p:clrMapOvr>
     <a:masterClrMapping/>
   </p:clrMapOvr>
-  <mc:AlternateContent xmlns:mc="http://schemas.openxmlformats.org/markup-compatibility/2006">
-    <mc:Choice xmlns:p14="http://schemas.microsoft.com/office/powerpoint/2010/main" Requires="p14">
+  <mc:AlternateContent xmlns:mc="http://schemas.openxmlformats.org/markup-compatibility/2006" xmlns:p14="http://schemas.microsoft.com/office/powerpoint/2010/main">
+    <mc:Choice Requires="p14">
       <p:transition spd="med" p14:dur="700">
         <p:fade/>
       </p:transition>
     </mc:Choice>
-    <mc:Fallback>
+    <mc:Fallback xmlns="">
       <p:transition spd="med">
         <p:fade/>
       </p:transition>
     </mc:Fallback>
   </mc:AlternateContent>
-  <p:timing>
-    <p:tnLst>
-      <p:par>
-        <p:cTn id="1" dur="indefinite" restart="never" nodeType="tmRoot"/>
-      </p:par>
-    </p:tnLst>
-  </p:timing>
 </p:sld>
 </file>
 
@@ -5790,11 +6065,11 @@
           <a:lstStyle/>
           <a:p>
             <a:r>
-              <a:rPr lang="de-CH" dirty="0" smtClean="0"/>
+              <a:rPr lang="de-CH" dirty="0"/>
               <a:t>Vorführung </a:t>
             </a:r>
             <a:r>
-              <a:rPr lang="de-CH" dirty="0" err="1" smtClean="0"/>
+              <a:rPr lang="de-CH" dirty="0" err="1"/>
               <a:t>Hashi</a:t>
             </a:r>
             <a:r>
@@ -5853,25 +6128,18 @@
   <p:clrMapOvr>
     <a:masterClrMapping/>
   </p:clrMapOvr>
-  <mc:AlternateContent xmlns:mc="http://schemas.openxmlformats.org/markup-compatibility/2006">
-    <mc:Choice xmlns:p14="http://schemas.microsoft.com/office/powerpoint/2010/main" Requires="p14">
+  <mc:AlternateContent xmlns:mc="http://schemas.openxmlformats.org/markup-compatibility/2006" xmlns:p14="http://schemas.microsoft.com/office/powerpoint/2010/main">
+    <mc:Choice Requires="p14">
       <p:transition spd="med" p14:dur="700">
         <p:fade/>
       </p:transition>
     </mc:Choice>
-    <mc:Fallback>
+    <mc:Fallback xmlns="">
       <p:transition spd="med">
         <p:fade/>
       </p:transition>
     </mc:Fallback>
   </mc:AlternateContent>
-  <p:timing>
-    <p:tnLst>
-      <p:par>
-        <p:cTn id="1" dur="indefinite" restart="never" nodeType="tmRoot"/>
-      </p:par>
-    </p:tnLst>
-  </p:timing>
 </p:sld>
 </file>
 
@@ -5943,25 +6211,18 @@
   <p:clrMapOvr>
     <a:masterClrMapping/>
   </p:clrMapOvr>
-  <mc:AlternateContent xmlns:mc="http://schemas.openxmlformats.org/markup-compatibility/2006">
-    <mc:Choice xmlns:p14="http://schemas.microsoft.com/office/powerpoint/2010/main" Requires="p14">
+  <mc:AlternateContent xmlns:mc="http://schemas.openxmlformats.org/markup-compatibility/2006" xmlns:p14="http://schemas.microsoft.com/office/powerpoint/2010/main">
+    <mc:Choice Requires="p14">
       <p:transition spd="med" p14:dur="700">
         <p:fade/>
       </p:transition>
     </mc:Choice>
-    <mc:Fallback>
+    <mc:Fallback xmlns="">
       <p:transition spd="med">
         <p:fade/>
       </p:transition>
     </mc:Fallback>
   </mc:AlternateContent>
-  <p:timing>
-    <p:tnLst>
-      <p:par>
-        <p:cTn id="1" dur="indefinite" restart="never" nodeType="tmRoot"/>
-      </p:par>
-    </p:tnLst>
-  </p:timing>
 </p:sld>
 </file>
 
@@ -5998,10 +6259,9 @@
           <a:lstStyle/>
           <a:p>
             <a:r>
-              <a:rPr lang="de-CH" dirty="0" smtClean="0"/>
+              <a:rPr lang="de-CH" dirty="0"/>
               <a:t>Ablauf</a:t>
             </a:r>
-            <a:endParaRPr lang="de-CH" dirty="0"/>
           </a:p>
         </p:txBody>
       </p:sp>
@@ -6023,102 +6283,102 @@
           <a:lstStyle/>
           <a:p>
             <a:r>
-              <a:rPr lang="de-CH" dirty="0" smtClean="0"/>
+              <a:rPr lang="de-CH" dirty="0"/>
               <a:t>Prozessmodell </a:t>
             </a:r>
             <a:r>
-              <a:rPr lang="de-CH" dirty="0" err="1" smtClean="0"/>
+              <a:rPr lang="de-CH" dirty="0" err="1"/>
               <a:t>Scrum</a:t>
             </a:r>
-            <a:endParaRPr lang="de-CH" dirty="0" smtClean="0"/>
-          </a:p>
-          <a:p>
-            <a:r>
-              <a:rPr lang="de-CH" dirty="0" smtClean="0"/>
+            <a:endParaRPr lang="de-CH" dirty="0"/>
+          </a:p>
+          <a:p>
+            <a:r>
+              <a:rPr lang="de-CH" dirty="0"/>
               <a:t>Entwicklungsschritte</a:t>
             </a:r>
           </a:p>
           <a:p>
             <a:pPr lvl="1"/>
             <a:r>
-              <a:rPr lang="de-CH" dirty="0" smtClean="0"/>
+              <a:rPr lang="de-CH" dirty="0"/>
               <a:t>User Stories</a:t>
             </a:r>
           </a:p>
           <a:p>
             <a:pPr lvl="1"/>
             <a:r>
-              <a:rPr lang="de-CH" dirty="0" err="1" smtClean="0"/>
+              <a:rPr lang="de-CH" dirty="0" err="1"/>
               <a:t>Product</a:t>
             </a:r>
             <a:r>
-              <a:rPr lang="de-CH" dirty="0" smtClean="0"/>
+              <a:rPr lang="de-CH" dirty="0"/>
               <a:t> und Sprint </a:t>
             </a:r>
             <a:r>
-              <a:rPr lang="de-CH" dirty="0" err="1" smtClean="0"/>
+              <a:rPr lang="de-CH" dirty="0" err="1"/>
               <a:t>Backlog</a:t>
             </a:r>
-            <a:endParaRPr lang="de-CH" dirty="0" smtClean="0"/>
-          </a:p>
-          <a:p>
-            <a:r>
-              <a:rPr lang="de-CH" dirty="0" smtClean="0"/>
+            <a:endParaRPr lang="de-CH" dirty="0"/>
+          </a:p>
+          <a:p>
+            <a:r>
+              <a:rPr lang="de-CH" dirty="0"/>
               <a:t>Software</a:t>
             </a:r>
           </a:p>
           <a:p>
             <a:pPr lvl="1"/>
             <a:r>
-              <a:rPr lang="de-CH" dirty="0" smtClean="0"/>
+              <a:rPr lang="de-CH" dirty="0"/>
               <a:t>Klassendiagramme</a:t>
             </a:r>
           </a:p>
           <a:p>
             <a:pPr lvl="1"/>
             <a:r>
-              <a:rPr lang="de-CH" dirty="0" smtClean="0"/>
+              <a:rPr lang="de-CH" dirty="0"/>
               <a:t>Verwendete Patterns</a:t>
             </a:r>
           </a:p>
           <a:p>
             <a:pPr lvl="1"/>
             <a:r>
-              <a:rPr lang="de-CH" dirty="0" smtClean="0"/>
+              <a:rPr lang="de-CH" dirty="0"/>
               <a:t>Spiel speichern/laden</a:t>
             </a:r>
           </a:p>
           <a:p>
             <a:r>
-              <a:rPr lang="de-CH" dirty="0" smtClean="0"/>
+              <a:rPr lang="de-CH" dirty="0"/>
               <a:t>Metriken und Tests</a:t>
             </a:r>
           </a:p>
           <a:p>
             <a:r>
-              <a:rPr lang="de-CH" dirty="0" smtClean="0"/>
+              <a:rPr lang="de-CH" dirty="0"/>
               <a:t>Erfahrungen</a:t>
             </a:r>
           </a:p>
           <a:p>
             <a:r>
-              <a:rPr lang="de-CH" dirty="0" smtClean="0"/>
+              <a:rPr lang="de-CH" dirty="0"/>
               <a:t>Vergleich der Prozesse</a:t>
             </a:r>
           </a:p>
           <a:p>
             <a:r>
-              <a:rPr lang="de-CH" dirty="0" smtClean="0"/>
+              <a:rPr lang="de-CH" dirty="0"/>
               <a:t>Vorführung </a:t>
             </a:r>
             <a:r>
-              <a:rPr lang="de-CH" dirty="0" err="1" smtClean="0"/>
+              <a:rPr lang="de-CH" dirty="0" err="1"/>
               <a:t>Hashi</a:t>
             </a:r>
-            <a:endParaRPr lang="de-CH" dirty="0" smtClean="0"/>
-          </a:p>
-          <a:p>
-            <a:endParaRPr lang="de-CH" dirty="0" smtClean="0"/>
+            <a:endParaRPr lang="de-CH" dirty="0"/>
+          </a:p>
+          <a:p>
+            <a:endParaRPr lang="de-CH" dirty="0"/>
           </a:p>
         </p:txBody>
       </p:sp>
@@ -6132,25 +6392,18 @@
   <p:clrMapOvr>
     <a:masterClrMapping/>
   </p:clrMapOvr>
-  <mc:AlternateContent xmlns:mc="http://schemas.openxmlformats.org/markup-compatibility/2006">
-    <mc:Choice xmlns:p14="http://schemas.microsoft.com/office/powerpoint/2010/main" Requires="p14">
+  <mc:AlternateContent xmlns:mc="http://schemas.openxmlformats.org/markup-compatibility/2006" xmlns:p14="http://schemas.microsoft.com/office/powerpoint/2010/main">
+    <mc:Choice Requires="p14">
       <p:transition spd="med" p14:dur="700">
         <p:fade/>
       </p:transition>
     </mc:Choice>
-    <mc:Fallback>
+    <mc:Fallback xmlns="">
       <p:transition spd="med">
         <p:fade/>
       </p:transition>
     </mc:Fallback>
   </mc:AlternateContent>
-  <p:timing>
-    <p:tnLst>
-      <p:par>
-        <p:cTn id="1" dur="indefinite" restart="never" nodeType="tmRoot"/>
-      </p:par>
-    </p:tnLst>
-  </p:timing>
 </p:sld>
 </file>
 
@@ -6187,7 +6440,7 @@
           <a:lstStyle/>
           <a:p>
             <a:r>
-              <a:rPr lang="de-CH" dirty="0" err="1" smtClean="0"/>
+              <a:rPr lang="de-CH" dirty="0" err="1"/>
               <a:t>Scrum</a:t>
             </a:r>
             <a:endParaRPr lang="de-CH" dirty="0"/>
@@ -6210,7 +6463,7 @@
           <a:lstStyle/>
           <a:p>
             <a:r>
-              <a:rPr lang="de-CH" dirty="0" smtClean="0"/>
+              <a:rPr lang="de-CH" dirty="0"/>
               <a:t>User Stories</a:t>
             </a:r>
           </a:p>
@@ -6218,31 +6471,31 @@
             <a:endParaRPr lang="de-CH" dirty="0"/>
           </a:p>
           <a:p>
-            <a:endParaRPr lang="de-CH" dirty="0" smtClean="0"/>
-          </a:p>
-          <a:p>
             <a:endParaRPr lang="de-CH" dirty="0"/>
           </a:p>
           <a:p>
-            <a:endParaRPr lang="de-CH" dirty="0" smtClean="0"/>
-          </a:p>
-          <a:p>
-            <a:r>
-              <a:rPr lang="de-CH" dirty="0" err="1" smtClean="0"/>
+            <a:endParaRPr lang="de-CH" dirty="0"/>
+          </a:p>
+          <a:p>
+            <a:endParaRPr lang="de-CH" dirty="0"/>
+          </a:p>
+          <a:p>
+            <a:r>
+              <a:rPr lang="de-CH" dirty="0" err="1"/>
               <a:t>Product</a:t>
             </a:r>
             <a:r>
-              <a:rPr lang="de-CH" dirty="0" smtClean="0"/>
+              <a:rPr lang="de-CH" dirty="0"/>
               <a:t> </a:t>
             </a:r>
             <a:r>
-              <a:rPr lang="de-CH" dirty="0" err="1" smtClean="0"/>
+              <a:rPr lang="de-CH" dirty="0" err="1"/>
               <a:t>Backlog</a:t>
             </a:r>
-            <a:endParaRPr lang="de-CH" dirty="0" smtClean="0"/>
-          </a:p>
-          <a:p>
-            <a:endParaRPr lang="de-CH" dirty="0" smtClean="0"/>
+            <a:endParaRPr lang="de-CH" dirty="0"/>
+          </a:p>
+          <a:p>
+            <a:endParaRPr lang="de-CH" dirty="0"/>
           </a:p>
           <a:p>
             <a:endParaRPr lang="de-CH" dirty="0"/>
@@ -6307,25 +6560,18 @@
   <p:clrMapOvr>
     <a:masterClrMapping/>
   </p:clrMapOvr>
-  <mc:AlternateContent xmlns:mc="http://schemas.openxmlformats.org/markup-compatibility/2006">
-    <mc:Choice xmlns:p14="http://schemas.microsoft.com/office/powerpoint/2010/main" Requires="p14">
+  <mc:AlternateContent xmlns:mc="http://schemas.openxmlformats.org/markup-compatibility/2006" xmlns:p14="http://schemas.microsoft.com/office/powerpoint/2010/main">
+    <mc:Choice Requires="p14">
       <p:transition spd="med" p14:dur="700">
         <p:fade/>
       </p:transition>
     </mc:Choice>
-    <mc:Fallback>
+    <mc:Fallback xmlns="">
       <p:transition spd="med">
         <p:fade/>
       </p:transition>
     </mc:Fallback>
   </mc:AlternateContent>
-  <p:timing>
-    <p:tnLst>
-      <p:par>
-        <p:cTn id="1" dur="indefinite" restart="never" nodeType="tmRoot"/>
-      </p:par>
-    </p:tnLst>
-  </p:timing>
 </p:sld>
 </file>
 
@@ -6362,7 +6608,7 @@
           <a:lstStyle/>
           <a:p>
             <a:r>
-              <a:rPr lang="de-CH" dirty="0" err="1" smtClean="0"/>
+              <a:rPr lang="de-CH" dirty="0" err="1"/>
               <a:t>Scrum</a:t>
             </a:r>
             <a:endParaRPr lang="de-CH" dirty="0"/>
@@ -6385,23 +6631,23 @@
           <a:lstStyle/>
           <a:p>
             <a:r>
-              <a:rPr lang="de-CH" dirty="0" smtClean="0"/>
+              <a:rPr lang="de-CH" dirty="0"/>
               <a:t>Sprint </a:t>
             </a:r>
             <a:r>
-              <a:rPr lang="de-CH" dirty="0" err="1" smtClean="0"/>
+              <a:rPr lang="de-CH" dirty="0" err="1"/>
               <a:t>Backlog</a:t>
             </a:r>
-            <a:endParaRPr lang="de-CH" dirty="0" smtClean="0"/>
-          </a:p>
-          <a:p>
-            <a:endParaRPr lang="de-CH" dirty="0" smtClean="0"/>
-          </a:p>
-          <a:p>
             <a:endParaRPr lang="de-CH" dirty="0"/>
           </a:p>
           <a:p>
-            <a:endParaRPr lang="de-CH" dirty="0" smtClean="0"/>
+            <a:endParaRPr lang="de-CH" dirty="0"/>
+          </a:p>
+          <a:p>
+            <a:endParaRPr lang="de-CH" dirty="0"/>
+          </a:p>
+          <a:p>
+            <a:endParaRPr lang="de-CH" dirty="0"/>
           </a:p>
           <a:p>
             <a:endParaRPr lang="de-CH" dirty="0"/>
@@ -6442,25 +6688,18 @@
   <p:clrMapOvr>
     <a:masterClrMapping/>
   </p:clrMapOvr>
-  <mc:AlternateContent xmlns:mc="http://schemas.openxmlformats.org/markup-compatibility/2006">
-    <mc:Choice xmlns:p14="http://schemas.microsoft.com/office/powerpoint/2010/main" Requires="p14">
+  <mc:AlternateContent xmlns:mc="http://schemas.openxmlformats.org/markup-compatibility/2006" xmlns:p14="http://schemas.microsoft.com/office/powerpoint/2010/main">
+    <mc:Choice Requires="p14">
       <p:transition spd="med" p14:dur="700">
         <p:fade/>
       </p:transition>
     </mc:Choice>
-    <mc:Fallback>
+    <mc:Fallback xmlns="">
       <p:transition spd="med">
         <p:fade/>
       </p:transition>
     </mc:Fallback>
   </mc:AlternateContent>
-  <p:timing>
-    <p:tnLst>
-      <p:par>
-        <p:cTn id="1" dur="indefinite" restart="never" nodeType="tmRoot"/>
-      </p:par>
-    </p:tnLst>
-  </p:timing>
 </p:sld>
 </file>
 
@@ -6617,25 +6856,18 @@
   <p:clrMapOvr>
     <a:masterClrMapping/>
   </p:clrMapOvr>
-  <mc:AlternateContent xmlns:mc="http://schemas.openxmlformats.org/markup-compatibility/2006">
-    <mc:Choice xmlns:p14="http://schemas.microsoft.com/office/powerpoint/2010/main" Requires="p14">
+  <mc:AlternateContent xmlns:mc="http://schemas.openxmlformats.org/markup-compatibility/2006" xmlns:p14="http://schemas.microsoft.com/office/powerpoint/2010/main">
+    <mc:Choice Requires="p14">
       <p:transition spd="med" p14:dur="700">
         <p:fade/>
       </p:transition>
     </mc:Choice>
-    <mc:Fallback>
+    <mc:Fallback xmlns="">
       <p:transition spd="med">
         <p:fade/>
       </p:transition>
     </mc:Fallback>
   </mc:AlternateContent>
-  <p:timing>
-    <p:tnLst>
-      <p:par>
-        <p:cTn id="1" dur="indefinite" restart="never" nodeType="tmRoot"/>
-      </p:par>
-    </p:tnLst>
-  </p:timing>
 </p:sld>
 </file>
 
@@ -6792,25 +7024,18 @@
   <p:clrMapOvr>
     <a:masterClrMapping/>
   </p:clrMapOvr>
-  <mc:AlternateContent xmlns:mc="http://schemas.openxmlformats.org/markup-compatibility/2006">
-    <mc:Choice xmlns:p14="http://schemas.microsoft.com/office/powerpoint/2010/main" Requires="p14">
+  <mc:AlternateContent xmlns:mc="http://schemas.openxmlformats.org/markup-compatibility/2006" xmlns:p14="http://schemas.microsoft.com/office/powerpoint/2010/main">
+    <mc:Choice Requires="p14">
       <p:transition spd="med" p14:dur="700">
         <p:fade/>
       </p:transition>
     </mc:Choice>
-    <mc:Fallback>
+    <mc:Fallback xmlns="">
       <p:transition spd="med">
         <p:fade/>
       </p:transition>
     </mc:Fallback>
   </mc:AlternateContent>
-  <p:timing>
-    <p:tnLst>
-      <p:par>
-        <p:cTn id="1" dur="indefinite" restart="never" nodeType="tmRoot"/>
-      </p:par>
-    </p:tnLst>
-  </p:timing>
 </p:sld>
 </file>
 
@@ -6870,115 +7095,108 @@
           <a:p>
             <a:r>
               <a:rPr lang="de-CH" dirty="0"/>
-              <a:t>MVC (Model-View-Controller</a:t>
-            </a:r>
-            <a:r>
-              <a:rPr lang="de-CH" dirty="0" smtClean="0"/>
-              <a:t>)</a:t>
+              <a:t>MVC (Model-View-Controller)</a:t>
             </a:r>
           </a:p>
           <a:p>
             <a:pPr lvl="1"/>
             <a:r>
-              <a:rPr lang="de-CH" dirty="0" smtClean="0"/>
+              <a:rPr lang="de-CH" dirty="0"/>
               <a:t>Model (Verarbeitung/Datenhaltung)</a:t>
             </a:r>
           </a:p>
           <a:p>
             <a:pPr lvl="1"/>
             <a:r>
-              <a:rPr lang="de-CH" dirty="0" smtClean="0"/>
+              <a:rPr lang="de-CH" dirty="0"/>
               <a:t>View (GUI)</a:t>
             </a:r>
           </a:p>
           <a:p>
             <a:pPr lvl="1"/>
             <a:r>
-              <a:rPr lang="de-CH" dirty="0" smtClean="0"/>
+              <a:rPr lang="de-CH" dirty="0"/>
               <a:t>Controller (Eingaben im Spielfeld)</a:t>
             </a:r>
+          </a:p>
+          <a:p>
+            <a:r>
+              <a:rPr lang="de-CH" dirty="0" err="1"/>
+              <a:t>Decorator</a:t>
+            </a:r>
             <a:endParaRPr lang="de-CH" dirty="0"/>
           </a:p>
           <a:p>
-            <a:r>
-              <a:rPr lang="de-CH" dirty="0" err="1" smtClean="0"/>
-              <a:t>Decorator</a:t>
-            </a:r>
-            <a:endParaRPr lang="de-CH" dirty="0" smtClean="0"/>
-          </a:p>
-          <a:p>
             <a:pPr lvl="1"/>
             <a:r>
-              <a:rPr lang="de-CH" dirty="0" err="1" smtClean="0"/>
+              <a:rPr lang="de-CH" dirty="0" err="1"/>
               <a:t>Undo</a:t>
             </a:r>
             <a:r>
-              <a:rPr lang="de-CH" dirty="0" smtClean="0"/>
+              <a:rPr lang="de-CH" dirty="0"/>
               <a:t>/</a:t>
             </a:r>
             <a:r>
-              <a:rPr lang="de-CH" dirty="0" err="1" smtClean="0"/>
+              <a:rPr lang="de-CH" dirty="0" err="1"/>
               <a:t>Redo</a:t>
             </a:r>
             <a:endParaRPr lang="de-CH" dirty="0"/>
           </a:p>
           <a:p>
             <a:r>
-              <a:rPr lang="de-CH" dirty="0" smtClean="0"/>
+              <a:rPr lang="de-CH" dirty="0"/>
               <a:t>Command</a:t>
             </a:r>
           </a:p>
           <a:p>
             <a:pPr lvl="1"/>
             <a:r>
-              <a:rPr lang="de-CH" dirty="0" err="1" smtClean="0"/>
+              <a:rPr lang="de-CH" dirty="0" err="1"/>
               <a:t>Undo</a:t>
             </a:r>
             <a:r>
-              <a:rPr lang="de-CH" dirty="0" smtClean="0"/>
+              <a:rPr lang="de-CH" dirty="0"/>
               <a:t>/</a:t>
             </a:r>
             <a:r>
-              <a:rPr lang="de-CH" dirty="0" err="1" smtClean="0"/>
+              <a:rPr lang="de-CH" dirty="0" err="1"/>
               <a:t>Redo</a:t>
             </a:r>
-            <a:endParaRPr lang="de-CH" dirty="0" smtClean="0"/>
-          </a:p>
-          <a:p>
-            <a:r>
-              <a:rPr lang="de-CH" dirty="0" smtClean="0"/>
+            <a:endParaRPr lang="de-CH" dirty="0"/>
+          </a:p>
+          <a:p>
+            <a:r>
+              <a:rPr lang="de-CH" dirty="0"/>
               <a:t>Factory</a:t>
             </a:r>
           </a:p>
           <a:p>
             <a:pPr lvl="1"/>
             <a:r>
-              <a:rPr lang="de-CH" dirty="0" smtClean="0"/>
+              <a:rPr lang="de-CH" dirty="0"/>
               <a:t>Erstellen neuer Spielvorlage</a:t>
             </a:r>
-            <a:endParaRPr lang="de-CH" dirty="0"/>
-          </a:p>
-          <a:p>
-            <a:r>
-              <a:rPr lang="de-CH" dirty="0" smtClean="0"/>
+          </a:p>
+          <a:p>
+            <a:r>
+              <a:rPr lang="de-CH" dirty="0"/>
               <a:t>Template</a:t>
             </a:r>
           </a:p>
           <a:p>
             <a:pPr lvl="1"/>
             <a:r>
-              <a:rPr lang="de-CH" dirty="0" smtClean="0"/>
+              <a:rPr lang="de-CH" dirty="0"/>
               <a:t>Abstrakte Klasse «</a:t>
             </a:r>
             <a:r>
-              <a:rPr lang="de-CH" dirty="0" err="1" smtClean="0"/>
+              <a:rPr lang="de-CH" dirty="0" err="1"/>
               <a:t>GameFieldController</a:t>
             </a:r>
             <a:r>
-              <a:rPr lang="de-CH" dirty="0" smtClean="0"/>
+              <a:rPr lang="de-CH" dirty="0"/>
               <a:t>»</a:t>
             </a:r>
-            <a:endParaRPr lang="de-CH" dirty="0"/>
           </a:p>
         </p:txBody>
       </p:sp>
@@ -6992,25 +7210,18 @@
   <p:clrMapOvr>
     <a:masterClrMapping/>
   </p:clrMapOvr>
-  <mc:AlternateContent xmlns:mc="http://schemas.openxmlformats.org/markup-compatibility/2006">
-    <mc:Choice xmlns:p14="http://schemas.microsoft.com/office/powerpoint/2010/main" Requires="p14">
+  <mc:AlternateContent xmlns:mc="http://schemas.openxmlformats.org/markup-compatibility/2006" xmlns:p14="http://schemas.microsoft.com/office/powerpoint/2010/main">
+    <mc:Choice Requires="p14">
       <p:transition spd="med" p14:dur="700">
         <p:fade/>
       </p:transition>
     </mc:Choice>
-    <mc:Fallback>
+    <mc:Fallback xmlns="">
       <p:transition spd="med">
         <p:fade/>
       </p:transition>
     </mc:Fallback>
   </mc:AlternateContent>
-  <p:timing>
-    <p:tnLst>
-      <p:par>
-        <p:cTn id="1" dur="indefinite" restart="never" nodeType="tmRoot"/>
-      </p:par>
-    </p:tnLst>
-  </p:timing>
 </p:sld>
 </file>
 
@@ -7048,13 +7259,8 @@
           <a:p>
             <a:r>
               <a:rPr lang="de-CH" dirty="0"/>
-              <a:t>Spiel </a:t>
-            </a:r>
-            <a:r>
-              <a:rPr lang="de-CH" dirty="0" smtClean="0"/>
-              <a:t>speichern/laden</a:t>
-            </a:r>
-            <a:endParaRPr lang="de-CH" dirty="0"/>
+              <a:t>Spiel speichern/laden</a:t>
+            </a:r>
           </a:p>
         </p:txBody>
       </p:sp>
@@ -7074,22 +7280,21 @@
           <a:lstStyle/>
           <a:p>
             <a:r>
-              <a:rPr lang="de-CH" dirty="0" smtClean="0"/>
+              <a:rPr lang="de-CH" dirty="0"/>
               <a:t>Basierend auf neo4j (Graphische Datenbank)</a:t>
             </a:r>
           </a:p>
           <a:p>
             <a:r>
-              <a:rPr lang="de-CH" dirty="0" smtClean="0"/>
+              <a:rPr lang="de-CH" dirty="0"/>
               <a:t>Funktionen speichern und laden integriert</a:t>
             </a:r>
           </a:p>
           <a:p>
             <a:r>
-              <a:rPr lang="de-CH" dirty="0" smtClean="0"/>
+              <a:rPr lang="de-CH" dirty="0"/>
               <a:t>Datenbank in XML oder JSON Format</a:t>
             </a:r>
-            <a:endParaRPr lang="de-CH" dirty="0"/>
           </a:p>
         </p:txBody>
       </p:sp>
@@ -7103,25 +7308,18 @@
   <p:clrMapOvr>
     <a:masterClrMapping/>
   </p:clrMapOvr>
-  <mc:AlternateContent xmlns:mc="http://schemas.openxmlformats.org/markup-compatibility/2006">
-    <mc:Choice xmlns:p14="http://schemas.microsoft.com/office/powerpoint/2010/main" Requires="p14">
+  <mc:AlternateContent xmlns:mc="http://schemas.openxmlformats.org/markup-compatibility/2006" xmlns:p14="http://schemas.microsoft.com/office/powerpoint/2010/main">
+    <mc:Choice Requires="p14">
       <p:transition spd="med" p14:dur="700">
         <p:fade/>
       </p:transition>
     </mc:Choice>
-    <mc:Fallback>
+    <mc:Fallback xmlns="">
       <p:transition spd="med">
         <p:fade/>
       </p:transition>
     </mc:Fallback>
   </mc:AlternateContent>
-  <p:timing>
-    <p:tnLst>
-      <p:par>
-        <p:cTn id="1" dur="indefinite" restart="never" nodeType="tmRoot"/>
-      </p:par>
-    </p:tnLst>
-  </p:timing>
 </p:sld>
 </file>
 
@@ -7180,116 +7378,116 @@
           <a:lstStyle/>
           <a:p>
             <a:r>
-              <a:rPr lang="de-CH" dirty="0" smtClean="0"/>
+              <a:rPr lang="de-CH" dirty="0"/>
               <a:t>Tests</a:t>
             </a:r>
           </a:p>
           <a:p>
             <a:pPr lvl="1"/>
             <a:r>
-              <a:rPr lang="de-CH" dirty="0" err="1" smtClean="0"/>
+              <a:rPr lang="de-CH" dirty="0" err="1"/>
               <a:t>Junit</a:t>
             </a:r>
-            <a:endParaRPr lang="de-CH" dirty="0" smtClean="0"/>
+            <a:endParaRPr lang="de-CH" dirty="0"/>
           </a:p>
           <a:p>
             <a:pPr lvl="1"/>
             <a:r>
-              <a:rPr lang="de-CH" dirty="0" smtClean="0"/>
+              <a:rPr lang="de-CH" dirty="0"/>
               <a:t>Code-</a:t>
             </a:r>
             <a:r>
-              <a:rPr lang="de-CH" dirty="0" err="1" smtClean="0"/>
+              <a:rPr lang="de-CH" dirty="0" err="1"/>
               <a:t>Coverage</a:t>
             </a:r>
-            <a:endParaRPr lang="de-CH" dirty="0" smtClean="0"/>
+            <a:endParaRPr lang="de-CH" dirty="0"/>
           </a:p>
           <a:p>
             <a:pPr lvl="1"/>
             <a:r>
-              <a:rPr lang="de-CH" dirty="0" smtClean="0"/>
+              <a:rPr lang="de-CH" dirty="0"/>
               <a:t>Keine gravierende Fehler, jedoch Code besser strukturieren</a:t>
             </a:r>
           </a:p>
           <a:p>
             <a:r>
-              <a:rPr lang="de-CH" dirty="0" smtClean="0"/>
+              <a:rPr lang="de-CH" dirty="0"/>
               <a:t>Metrik</a:t>
             </a:r>
           </a:p>
           <a:p>
             <a:pPr lvl="1"/>
             <a:r>
-              <a:rPr lang="de-CH" dirty="0" smtClean="0"/>
+              <a:rPr lang="de-CH" dirty="0"/>
               <a:t>Software-Tool «Borland </a:t>
             </a:r>
             <a:r>
-              <a:rPr lang="de-CH" dirty="0" err="1" smtClean="0"/>
+              <a:rPr lang="de-CH" dirty="0" err="1"/>
               <a:t>Together</a:t>
             </a:r>
             <a:r>
-              <a:rPr lang="de-CH" dirty="0" smtClean="0"/>
+              <a:rPr lang="de-CH" dirty="0"/>
               <a:t>»</a:t>
             </a:r>
           </a:p>
           <a:p>
             <a:pPr lvl="1"/>
             <a:r>
-              <a:rPr lang="de-CH" dirty="0" smtClean="0"/>
+              <a:rPr lang="de-CH" dirty="0"/>
               <a:t>Schlechte CBO (</a:t>
             </a:r>
             <a:r>
-              <a:rPr lang="de-CH" dirty="0" err="1" smtClean="0"/>
+              <a:rPr lang="de-CH" dirty="0" err="1"/>
               <a:t>Coupling</a:t>
             </a:r>
             <a:r>
-              <a:rPr lang="de-CH" dirty="0" smtClean="0"/>
+              <a:rPr lang="de-CH" dirty="0"/>
               <a:t> </a:t>
             </a:r>
             <a:r>
-              <a:rPr lang="de-CH" dirty="0" err="1" smtClean="0"/>
+              <a:rPr lang="de-CH" dirty="0" err="1"/>
               <a:t>Between</a:t>
             </a:r>
             <a:r>
-              <a:rPr lang="de-CH" dirty="0" smtClean="0"/>
+              <a:rPr lang="de-CH" dirty="0"/>
               <a:t> Objects) und DOIH (</a:t>
             </a:r>
             <a:r>
-              <a:rPr lang="de-CH" dirty="0" err="1" smtClean="0"/>
+              <a:rPr lang="de-CH" dirty="0" err="1"/>
               <a:t>Depth</a:t>
             </a:r>
             <a:r>
-              <a:rPr lang="de-CH" dirty="0" smtClean="0"/>
+              <a:rPr lang="de-CH" dirty="0"/>
               <a:t> </a:t>
             </a:r>
             <a:r>
-              <a:rPr lang="de-CH" dirty="0" err="1" smtClean="0"/>
+              <a:rPr lang="de-CH" dirty="0" err="1"/>
               <a:t>of</a:t>
             </a:r>
             <a:r>
-              <a:rPr lang="de-CH" dirty="0" smtClean="0"/>
+              <a:rPr lang="de-CH" dirty="0"/>
               <a:t> </a:t>
             </a:r>
             <a:r>
-              <a:rPr lang="de-CH" dirty="0" err="1" smtClean="0"/>
+              <a:rPr lang="de-CH" dirty="0" err="1"/>
               <a:t>Inheritance</a:t>
             </a:r>
             <a:r>
-              <a:rPr lang="de-CH" dirty="0" smtClean="0"/>
+              <a:rPr lang="de-CH" dirty="0"/>
               <a:t> </a:t>
             </a:r>
             <a:r>
-              <a:rPr lang="de-CH" dirty="0" err="1" smtClean="0"/>
+              <a:rPr lang="de-CH" dirty="0" err="1"/>
               <a:t>Hierarchy</a:t>
             </a:r>
             <a:r>
-              <a:rPr lang="de-CH" dirty="0" smtClean="0"/>
+              <a:rPr lang="de-CH" dirty="0"/>
               <a:t>) Werte</a:t>
             </a:r>
           </a:p>
           <a:p>
             <a:pPr lvl="1"/>
-            <a:endParaRPr lang="de-CH" dirty="0" smtClean="0"/>
+            <a:endParaRPr lang="de-CH" dirty="0"/>
           </a:p>
         </p:txBody>
       </p:sp>
@@ -7331,25 +7529,18 @@
   <p:clrMapOvr>
     <a:masterClrMapping/>
   </p:clrMapOvr>
-  <mc:AlternateContent xmlns:mc="http://schemas.openxmlformats.org/markup-compatibility/2006">
-    <mc:Choice xmlns:p14="http://schemas.microsoft.com/office/powerpoint/2010/main" Requires="p14">
+  <mc:AlternateContent xmlns:mc="http://schemas.openxmlformats.org/markup-compatibility/2006" xmlns:p14="http://schemas.microsoft.com/office/powerpoint/2010/main">
+    <mc:Choice Requires="p14">
       <p:transition spd="med" p14:dur="700">
         <p:fade/>
       </p:transition>
     </mc:Choice>
-    <mc:Fallback>
+    <mc:Fallback xmlns="">
       <p:transition spd="med">
         <p:fade/>
       </p:transition>
     </mc:Fallback>
   </mc:AlternateContent>
-  <p:timing>
-    <p:tnLst>
-      <p:par>
-        <p:cTn id="1" dur="indefinite" restart="never" nodeType="tmRoot"/>
-      </p:par>
-    </p:tnLst>
-  </p:timing>
 </p:sld>
 </file>
 

</xml_diff>